<commit_message>
fix according to review
</commit_message>
<xml_diff>
--- a/Tutorials/whatiswot/7-JSON_Schema_in_Practice_2/7-JSON_Schema_in_Practice_2.pptx
+++ b/Tutorials/whatiswot/7-JSON_Schema_in_Practice_2/7-JSON_Schema_in_Practice_2.pptx
@@ -221,7 +221,7 @@
           <a:p>
             <a:fld id="{13D04914-C2D3-4F6E-9724-F68824787271}" type="datetimeFigureOut">
               <a:rPr lang="en-US" smtClean="0"/>
-              <a:t>8/31/23</a:t>
+              <a:t>9/4/23</a:t>
             </a:fld>
             <a:endParaRPr lang="en-US"/>
           </a:p>
@@ -1072,7 +1072,10 @@
           <a:bodyPr/>
           <a:lstStyle/>
           <a:p>
-            <a:endParaRPr lang="en-US" dirty="0"/>
+            <a:r>
+              <a:rPr lang="en-US" dirty="0"/>
+              <a:t>Let us explain Advanced Topic</a:t>
+            </a:r>
           </a:p>
         </p:txBody>
       </p:sp>
@@ -1489,7 +1492,27 @@
                 <a:effectLst/>
                 <a:latin typeface="Helvetica Neue"/>
               </a:rPr>
-              <a:t>All of these keywords must be set to an array, where each item is a Schema.</a:t>
+              <a:t>All of these keywords must be set to an array, </a:t>
+            </a:r>
+            <a:r>
+              <a:rPr lang="en-GB" b="0" i="0" u="none" strike="noStrike" dirty="0">
+                <a:solidFill>
+                  <a:srgbClr val="E6EDF3"/>
+                </a:solidFill>
+                <a:effectLst/>
+                <a:latin typeface="-apple-system"/>
+              </a:rPr>
+              <a:t>where each item is a Schema, referred to as </a:t>
+            </a:r>
+            <a:r>
+              <a:rPr lang="en-GB" b="0" i="0" u="none" strike="noStrike">
+                <a:solidFill>
+                  <a:srgbClr val="E6EDF3"/>
+                </a:solidFill>
+                <a:effectLst/>
+                <a:latin typeface="-apple-system"/>
+              </a:rPr>
+              <a:t>a subschema.</a:t>
             </a:r>
             <a:endParaRPr lang="tr-TR" b="0" i="0" dirty="0">
               <a:solidFill>
@@ -2091,7 +2114,7 @@
           <a:p>
             <a:fld id="{E81D2DD5-AB34-4770-8994-7B1025545EF3}" type="datetimeFigureOut">
               <a:rPr lang="en-US" smtClean="0"/>
-              <a:t>8/31/23</a:t>
+              <a:t>9/4/23</a:t>
             </a:fld>
             <a:endParaRPr lang="en-US"/>
           </a:p>
@@ -2261,7 +2284,7 @@
           <a:p>
             <a:fld id="{E81D2DD5-AB34-4770-8994-7B1025545EF3}" type="datetimeFigureOut">
               <a:rPr lang="en-US" smtClean="0"/>
-              <a:t>8/31/23</a:t>
+              <a:t>9/4/23</a:t>
             </a:fld>
             <a:endParaRPr lang="en-US"/>
           </a:p>
@@ -2441,7 +2464,7 @@
           <a:p>
             <a:fld id="{E81D2DD5-AB34-4770-8994-7B1025545EF3}" type="datetimeFigureOut">
               <a:rPr lang="en-US" smtClean="0"/>
-              <a:t>8/31/23</a:t>
+              <a:t>9/4/23</a:t>
             </a:fld>
             <a:endParaRPr lang="en-US"/>
           </a:p>
@@ -2611,7 +2634,7 @@
           <a:p>
             <a:fld id="{E81D2DD5-AB34-4770-8994-7B1025545EF3}" type="datetimeFigureOut">
               <a:rPr lang="en-US" smtClean="0"/>
-              <a:t>8/31/23</a:t>
+              <a:t>9/4/23</a:t>
             </a:fld>
             <a:endParaRPr lang="en-US"/>
           </a:p>
@@ -2857,7 +2880,7 @@
           <a:p>
             <a:fld id="{E81D2DD5-AB34-4770-8994-7B1025545EF3}" type="datetimeFigureOut">
               <a:rPr lang="en-US" smtClean="0"/>
-              <a:t>8/31/23</a:t>
+              <a:t>9/4/23</a:t>
             </a:fld>
             <a:endParaRPr lang="en-US"/>
           </a:p>
@@ -3089,7 +3112,7 @@
           <a:p>
             <a:fld id="{E81D2DD5-AB34-4770-8994-7B1025545EF3}" type="datetimeFigureOut">
               <a:rPr lang="en-US" smtClean="0"/>
-              <a:t>8/31/23</a:t>
+              <a:t>9/4/23</a:t>
             </a:fld>
             <a:endParaRPr lang="en-US"/>
           </a:p>
@@ -3456,7 +3479,7 @@
           <a:p>
             <a:fld id="{E81D2DD5-AB34-4770-8994-7B1025545EF3}" type="datetimeFigureOut">
               <a:rPr lang="en-US" smtClean="0"/>
-              <a:t>8/31/23</a:t>
+              <a:t>9/4/23</a:t>
             </a:fld>
             <a:endParaRPr lang="en-US"/>
           </a:p>
@@ -3574,7 +3597,7 @@
           <a:p>
             <a:fld id="{E81D2DD5-AB34-4770-8994-7B1025545EF3}" type="datetimeFigureOut">
               <a:rPr lang="en-US" smtClean="0"/>
-              <a:t>8/31/23</a:t>
+              <a:t>9/4/23</a:t>
             </a:fld>
             <a:endParaRPr lang="en-US"/>
           </a:p>
@@ -3669,7 +3692,7 @@
           <a:p>
             <a:fld id="{E81D2DD5-AB34-4770-8994-7B1025545EF3}" type="datetimeFigureOut">
               <a:rPr lang="en-US" smtClean="0"/>
-              <a:t>8/31/23</a:t>
+              <a:t>9/4/23</a:t>
             </a:fld>
             <a:endParaRPr lang="en-US"/>
           </a:p>
@@ -3946,7 +3969,7 @@
           <a:p>
             <a:fld id="{E81D2DD5-AB34-4770-8994-7B1025545EF3}" type="datetimeFigureOut">
               <a:rPr lang="en-US" smtClean="0"/>
-              <a:t>8/31/23</a:t>
+              <a:t>9/4/23</a:t>
             </a:fld>
             <a:endParaRPr lang="en-US"/>
           </a:p>
@@ -4203,7 +4226,7 @@
           <a:p>
             <a:fld id="{E81D2DD5-AB34-4770-8994-7B1025545EF3}" type="datetimeFigureOut">
               <a:rPr lang="en-US" smtClean="0"/>
-              <a:t>8/31/23</a:t>
+              <a:t>9/4/23</a:t>
             </a:fld>
             <a:endParaRPr lang="en-US"/>
           </a:p>
@@ -4421,7 +4444,7 @@
           <a:p>
             <a:fld id="{E81D2DD5-AB34-4770-8994-7B1025545EF3}" type="datetimeFigureOut">
               <a:rPr lang="en-US" smtClean="0"/>
-              <a:t>8/31/23</a:t>
+              <a:t>9/4/23</a:t>
             </a:fld>
             <a:endParaRPr lang="en-US"/>
           </a:p>
@@ -12692,13 +12715,13 @@
   <p:clrMapOvr>
     <a:masterClrMapping/>
   </p:clrMapOvr>
-  <mc:AlternateContent xmlns:mc="http://schemas.openxmlformats.org/markup-compatibility/2006">
-    <mc:Choice xmlns:p159="http://schemas.microsoft.com/office/powerpoint/2015/09/main" Requires="p159">
+  <mc:AlternateContent xmlns:mc="http://schemas.openxmlformats.org/markup-compatibility/2006" xmlns:p159="http://schemas.microsoft.com/office/powerpoint/2015/09/main">
+    <mc:Choice Requires="p159">
       <p:transition xmlns:p14="http://schemas.microsoft.com/office/powerpoint/2010/main" spd="slow" p14:dur="2000">
         <p159:morph option="byObject"/>
       </p:transition>
     </mc:Choice>
-    <mc:Fallback>
+    <mc:Fallback xmlns="">
       <p:transition spd="slow">
         <p:fade/>
       </p:transition>
@@ -18026,9 +18049,9 @@
         <p:grpSpPr>
           <a:xfrm>
             <a:off x="863477" y="2548552"/>
-            <a:ext cx="10465046" cy="2413688"/>
+            <a:ext cx="10393566" cy="2413688"/>
             <a:chOff x="216355" y="2402780"/>
-            <a:chExt cx="10465046" cy="2413688"/>
+            <a:chExt cx="10393566" cy="2413688"/>
           </a:xfrm>
         </p:grpSpPr>
         <p:sp>
@@ -18047,7 +18070,7 @@
           </p:nvSpPr>
           <p:spPr bwMode="auto">
             <a:xfrm>
-              <a:off x="1582435" y="4200177"/>
+              <a:off x="1510955" y="4200177"/>
               <a:ext cx="9098966" cy="575863"/>
             </a:xfrm>
             <a:prstGeom prst="rect">
@@ -18287,7 +18310,7 @@
           </p:nvSpPr>
           <p:spPr bwMode="auto">
             <a:xfrm>
-              <a:off x="1285325" y="2443207"/>
+              <a:off x="1510955" y="2443207"/>
               <a:ext cx="7712368" cy="575863"/>
             </a:xfrm>
             <a:prstGeom prst="rect">
@@ -18500,7 +18523,7 @@
           </p:nvSpPr>
           <p:spPr bwMode="auto">
             <a:xfrm>
-              <a:off x="1510849" y="3304761"/>
+              <a:off x="1510955" y="3304761"/>
               <a:ext cx="7697941" cy="575863"/>
             </a:xfrm>
             <a:prstGeom prst="rect">

</xml_diff>